<commit_message>
Minor changes to strategies
</commit_message>
<xml_diff>
--- a/examinable/Analysis of data.pptx
+++ b/examinable/Analysis of data.pptx
@@ -9,6 +9,9 @@
     <p:sldId id="257" r:id="rId3"/>
     <p:sldId id="258" r:id="rId4"/>
     <p:sldId id="259" r:id="rId5"/>
+    <p:sldId id="260" r:id="rId6"/>
+    <p:sldId id="261" r:id="rId7"/>
+    <p:sldId id="262" r:id="rId8"/>
   </p:sldIdLst>
   <p:sldSz cx="12192000" cy="6858000"/>
   <p:notesSz cx="6858000" cy="9144000"/>
@@ -107,6 +110,11 @@
       </a:defRPr>
     </a:lvl9pPr>
   </p:defaultTextStyle>
+  <p:extLst>
+    <p:ext uri="{EFAFB233-063F-42B5-8137-9DF3F51BA10A}">
+      <p15:sldGuideLst xmlns:p15="http://schemas.microsoft.com/office/powerpoint/2012/main"/>
+    </p:ext>
+  </p:extLst>
 </p:presentation>
 </file>
 
@@ -257,7 +265,7 @@
           <a:p>
             <a:fld id="{13505A5A-E45C-400B-901B-5C11D318B268}" type="datetimeFigureOut">
               <a:rPr lang="en-GB" smtClean="0"/>
-              <a:t>23/12/2024</a:t>
+              <a:t>21/01/2025</a:t>
             </a:fld>
             <a:endParaRPr lang="en-GB"/>
           </a:p>
@@ -455,7 +463,7 @@
           <a:p>
             <a:fld id="{13505A5A-E45C-400B-901B-5C11D318B268}" type="datetimeFigureOut">
               <a:rPr lang="en-GB" smtClean="0"/>
-              <a:t>23/12/2024</a:t>
+              <a:t>21/01/2025</a:t>
             </a:fld>
             <a:endParaRPr lang="en-GB"/>
           </a:p>
@@ -663,7 +671,7 @@
           <a:p>
             <a:fld id="{13505A5A-E45C-400B-901B-5C11D318B268}" type="datetimeFigureOut">
               <a:rPr lang="en-GB" smtClean="0"/>
-              <a:t>23/12/2024</a:t>
+              <a:t>21/01/2025</a:t>
             </a:fld>
             <a:endParaRPr lang="en-GB"/>
           </a:p>
@@ -861,7 +869,7 @@
           <a:p>
             <a:fld id="{13505A5A-E45C-400B-901B-5C11D318B268}" type="datetimeFigureOut">
               <a:rPr lang="en-GB" smtClean="0"/>
-              <a:t>23/12/2024</a:t>
+              <a:t>21/01/2025</a:t>
             </a:fld>
             <a:endParaRPr lang="en-GB"/>
           </a:p>
@@ -1136,7 +1144,7 @@
           <a:p>
             <a:fld id="{13505A5A-E45C-400B-901B-5C11D318B268}" type="datetimeFigureOut">
               <a:rPr lang="en-GB" smtClean="0"/>
-              <a:t>23/12/2024</a:t>
+              <a:t>21/01/2025</a:t>
             </a:fld>
             <a:endParaRPr lang="en-GB"/>
           </a:p>
@@ -1401,7 +1409,7 @@
           <a:p>
             <a:fld id="{13505A5A-E45C-400B-901B-5C11D318B268}" type="datetimeFigureOut">
               <a:rPr lang="en-GB" smtClean="0"/>
-              <a:t>23/12/2024</a:t>
+              <a:t>21/01/2025</a:t>
             </a:fld>
             <a:endParaRPr lang="en-GB"/>
           </a:p>
@@ -1813,7 +1821,7 @@
           <a:p>
             <a:fld id="{13505A5A-E45C-400B-901B-5C11D318B268}" type="datetimeFigureOut">
               <a:rPr lang="en-GB" smtClean="0"/>
-              <a:t>23/12/2024</a:t>
+              <a:t>21/01/2025</a:t>
             </a:fld>
             <a:endParaRPr lang="en-GB"/>
           </a:p>
@@ -1954,7 +1962,7 @@
           <a:p>
             <a:fld id="{13505A5A-E45C-400B-901B-5C11D318B268}" type="datetimeFigureOut">
               <a:rPr lang="en-GB" smtClean="0"/>
-              <a:t>23/12/2024</a:t>
+              <a:t>21/01/2025</a:t>
             </a:fld>
             <a:endParaRPr lang="en-GB"/>
           </a:p>
@@ -2067,7 +2075,7 @@
           <a:p>
             <a:fld id="{13505A5A-E45C-400B-901B-5C11D318B268}" type="datetimeFigureOut">
               <a:rPr lang="en-GB" smtClean="0"/>
-              <a:t>23/12/2024</a:t>
+              <a:t>21/01/2025</a:t>
             </a:fld>
             <a:endParaRPr lang="en-GB"/>
           </a:p>
@@ -2378,7 +2386,7 @@
           <a:p>
             <a:fld id="{13505A5A-E45C-400B-901B-5C11D318B268}" type="datetimeFigureOut">
               <a:rPr lang="en-GB" smtClean="0"/>
-              <a:t>23/12/2024</a:t>
+              <a:t>21/01/2025</a:t>
             </a:fld>
             <a:endParaRPr lang="en-GB"/>
           </a:p>
@@ -2666,7 +2674,7 @@
           <a:p>
             <a:fld id="{13505A5A-E45C-400B-901B-5C11D318B268}" type="datetimeFigureOut">
               <a:rPr lang="en-GB" smtClean="0"/>
-              <a:t>23/12/2024</a:t>
+              <a:t>21/01/2025</a:t>
             </a:fld>
             <a:endParaRPr lang="en-GB"/>
           </a:p>
@@ -2907,7 +2915,7 @@
           <a:p>
             <a:fld id="{13505A5A-E45C-400B-901B-5C11D318B268}" type="datetimeFigureOut">
               <a:rPr lang="en-GB" smtClean="0"/>
-              <a:t>23/12/2024</a:t>
+              <a:t>21/01/2025</a:t>
             </a:fld>
             <a:endParaRPr lang="en-GB"/>
           </a:p>
@@ -3936,6 +3944,323 @@
     <p:extLst>
       <p:ext uri="{BB962C8B-B14F-4D97-AF65-F5344CB8AC3E}">
         <p14:creationId xmlns:p14="http://schemas.microsoft.com/office/powerpoint/2010/main" val="1639141767"/>
+      </p:ext>
+    </p:extLst>
+  </p:cSld>
+  <p:clrMapOvr>
+    <a:masterClrMapping/>
+  </p:clrMapOvr>
+</p:sld>
+</file>
+
+<file path=ppt/slides/slide5.xml><?xml version="1.0" encoding="utf-8"?>
+<p:sld xmlns:a="http://schemas.openxmlformats.org/drawingml/2006/main" xmlns:r="http://schemas.openxmlformats.org/officeDocument/2006/relationships" xmlns:p="http://schemas.openxmlformats.org/presentationml/2006/main">
+  <p:cSld>
+    <p:spTree>
+      <p:nvGrpSpPr>
+        <p:cNvPr id="1" name=""/>
+        <p:cNvGrpSpPr/>
+        <p:nvPr/>
+      </p:nvGrpSpPr>
+      <p:grpSpPr>
+        <a:xfrm>
+          <a:off x="0" y="0"/>
+          <a:ext cx="0" cy="0"/>
+          <a:chOff x="0" y="0"/>
+          <a:chExt cx="0" cy="0"/>
+        </a:xfrm>
+      </p:grpSpPr>
+      <p:sp>
+        <p:nvSpPr>
+          <p:cNvPr id="2" name="Title 1">
+            <a:extLst>
+              <a:ext uri="{FF2B5EF4-FFF2-40B4-BE49-F238E27FC236}">
+                <a16:creationId xmlns:a16="http://schemas.microsoft.com/office/drawing/2014/main" id="{84A18CB0-990B-2A7B-C723-DCA64EC93460}"/>
+              </a:ext>
+            </a:extLst>
+          </p:cNvPr>
+          <p:cNvSpPr>
+            <a:spLocks noGrp="1"/>
+          </p:cNvSpPr>
+          <p:nvPr>
+            <p:ph type="title"/>
+          </p:nvPr>
+        </p:nvSpPr>
+        <p:spPr/>
+        <p:txBody>
+          <a:bodyPr/>
+          <a:lstStyle/>
+          <a:p>
+            <a:r>
+              <a:rPr lang="en-GB" dirty="0"/>
+              <a:t>Sorted Non-Sorted Comparison 221224-2330.json</a:t>
+            </a:r>
+          </a:p>
+        </p:txBody>
+      </p:sp>
+      <p:pic>
+        <p:nvPicPr>
+          <p:cNvPr id="5" name="Picture 4" descr="A graph with different colored lines&#10;&#10;Description automatically generated">
+            <a:extLst>
+              <a:ext uri="{FF2B5EF4-FFF2-40B4-BE49-F238E27FC236}">
+                <a16:creationId xmlns:a16="http://schemas.microsoft.com/office/drawing/2014/main" id="{66EB98D2-D06B-235E-06D5-B76754FCF6FB}"/>
+              </a:ext>
+            </a:extLst>
+          </p:cNvPr>
+          <p:cNvPicPr>
+            <a:picLocks noChangeAspect="1"/>
+          </p:cNvPicPr>
+          <p:nvPr/>
+        </p:nvPicPr>
+        <p:blipFill>
+          <a:blip r:embed="rId2">
+            <a:extLst>
+              <a:ext uri="{28A0092B-C50C-407E-A947-70E740481C1C}">
+                <a14:useLocalDpi xmlns:a14="http://schemas.microsoft.com/office/drawing/2010/main" val="0"/>
+              </a:ext>
+            </a:extLst>
+          </a:blip>
+          <a:stretch>
+            <a:fillRect/>
+          </a:stretch>
+        </p:blipFill>
+        <p:spPr>
+          <a:xfrm>
+            <a:off x="838200" y="2057395"/>
+            <a:ext cx="5751587" cy="4297689"/>
+          </a:xfrm>
+          <a:prstGeom prst="rect">
+            <a:avLst/>
+          </a:prstGeom>
+        </p:spPr>
+      </p:pic>
+    </p:spTree>
+    <p:extLst>
+      <p:ext uri="{BB962C8B-B14F-4D97-AF65-F5344CB8AC3E}">
+        <p14:creationId xmlns:p14="http://schemas.microsoft.com/office/powerpoint/2010/main" val="3447382799"/>
+      </p:ext>
+    </p:extLst>
+  </p:cSld>
+  <p:clrMapOvr>
+    <a:masterClrMapping/>
+  </p:clrMapOvr>
+</p:sld>
+</file>
+
+<file path=ppt/slides/slide6.xml><?xml version="1.0" encoding="utf-8"?>
+<p:sld xmlns:a="http://schemas.openxmlformats.org/drawingml/2006/main" xmlns:r="http://schemas.openxmlformats.org/officeDocument/2006/relationships" xmlns:p="http://schemas.openxmlformats.org/presentationml/2006/main">
+  <p:cSld>
+    <p:spTree>
+      <p:nvGrpSpPr>
+        <p:cNvPr id="1" name=""/>
+        <p:cNvGrpSpPr/>
+        <p:nvPr/>
+      </p:nvGrpSpPr>
+      <p:grpSpPr>
+        <a:xfrm>
+          <a:off x="0" y="0"/>
+          <a:ext cx="0" cy="0"/>
+          <a:chOff x="0" y="0"/>
+          <a:chExt cx="0" cy="0"/>
+        </a:xfrm>
+      </p:grpSpPr>
+      <p:sp>
+        <p:nvSpPr>
+          <p:cNvPr id="2" name="Title 1">
+            <a:extLst>
+              <a:ext uri="{FF2B5EF4-FFF2-40B4-BE49-F238E27FC236}">
+                <a16:creationId xmlns:a16="http://schemas.microsoft.com/office/drawing/2014/main" id="{B272DF5F-1C28-817A-85E3-C4A83C50C29A}"/>
+              </a:ext>
+            </a:extLst>
+          </p:cNvPr>
+          <p:cNvSpPr>
+            <a:spLocks noGrp="1"/>
+          </p:cNvSpPr>
+          <p:nvPr>
+            <p:ph type="title"/>
+          </p:nvPr>
+        </p:nvSpPr>
+        <p:spPr/>
+        <p:txBody>
+          <a:bodyPr/>
+          <a:lstStyle/>
+          <a:p>
+            <a:r>
+              <a:rPr lang="en-GB" dirty="0"/>
+              <a:t>Same as previous page – emphasis on closeness</a:t>
+            </a:r>
+          </a:p>
+        </p:txBody>
+      </p:sp>
+      <p:pic>
+        <p:nvPicPr>
+          <p:cNvPr id="5" name="Picture 4" descr="A graph with blue and orange lines&#10;&#10;Description automatically generated">
+            <a:extLst>
+              <a:ext uri="{FF2B5EF4-FFF2-40B4-BE49-F238E27FC236}">
+                <a16:creationId xmlns:a16="http://schemas.microsoft.com/office/drawing/2014/main" id="{5D794F58-A2DD-0A22-F49F-48A721B308EA}"/>
+              </a:ext>
+            </a:extLst>
+          </p:cNvPr>
+          <p:cNvPicPr>
+            <a:picLocks noChangeAspect="1"/>
+          </p:cNvPicPr>
+          <p:nvPr/>
+        </p:nvPicPr>
+        <p:blipFill>
+          <a:blip r:embed="rId2">
+            <a:extLst>
+              <a:ext uri="{28A0092B-C50C-407E-A947-70E740481C1C}">
+                <a14:useLocalDpi xmlns:a14="http://schemas.microsoft.com/office/drawing/2010/main" val="0"/>
+              </a:ext>
+            </a:extLst>
+          </a:blip>
+          <a:stretch>
+            <a:fillRect/>
+          </a:stretch>
+        </p:blipFill>
+        <p:spPr>
+          <a:xfrm>
+            <a:off x="838200" y="1831202"/>
+            <a:ext cx="5852172" cy="4389129"/>
+          </a:xfrm>
+          <a:prstGeom prst="rect">
+            <a:avLst/>
+          </a:prstGeom>
+        </p:spPr>
+      </p:pic>
+    </p:spTree>
+    <p:extLst>
+      <p:ext uri="{BB962C8B-B14F-4D97-AF65-F5344CB8AC3E}">
+        <p14:creationId xmlns:p14="http://schemas.microsoft.com/office/powerpoint/2010/main" val="496558047"/>
+      </p:ext>
+    </p:extLst>
+  </p:cSld>
+  <p:clrMapOvr>
+    <a:masterClrMapping/>
+  </p:clrMapOvr>
+</p:sld>
+</file>
+
+<file path=ppt/slides/slide7.xml><?xml version="1.0" encoding="utf-8"?>
+<p:sld xmlns:a="http://schemas.openxmlformats.org/drawingml/2006/main" xmlns:r="http://schemas.openxmlformats.org/officeDocument/2006/relationships" xmlns:p="http://schemas.openxmlformats.org/presentationml/2006/main">
+  <p:cSld>
+    <p:spTree>
+      <p:nvGrpSpPr>
+        <p:cNvPr id="1" name=""/>
+        <p:cNvGrpSpPr/>
+        <p:nvPr/>
+      </p:nvGrpSpPr>
+      <p:grpSpPr>
+        <a:xfrm>
+          <a:off x="0" y="0"/>
+          <a:ext cx="0" cy="0"/>
+          <a:chOff x="0" y="0"/>
+          <a:chExt cx="0" cy="0"/>
+        </a:xfrm>
+      </p:grpSpPr>
+      <p:sp>
+        <p:nvSpPr>
+          <p:cNvPr id="2" name="Title 1">
+            <a:extLst>
+              <a:ext uri="{FF2B5EF4-FFF2-40B4-BE49-F238E27FC236}">
+                <a16:creationId xmlns:a16="http://schemas.microsoft.com/office/drawing/2014/main" id="{C46A1207-07B3-7A39-8ED5-EA2CAC58FE8E}"/>
+              </a:ext>
+            </a:extLst>
+          </p:cNvPr>
+          <p:cNvSpPr>
+            <a:spLocks noGrp="1"/>
+          </p:cNvSpPr>
+          <p:nvPr>
+            <p:ph type="title"/>
+          </p:nvPr>
+        </p:nvSpPr>
+        <p:spPr/>
+        <p:txBody>
+          <a:bodyPr/>
+          <a:lstStyle/>
+          <a:p>
+            <a:r>
+              <a:rPr lang="en-GB" dirty="0"/>
+              <a:t>Different initial starting amounts</a:t>
+            </a:r>
+          </a:p>
+        </p:txBody>
+      </p:sp>
+      <p:pic>
+        <p:nvPicPr>
+          <p:cNvPr id="5" name="Picture 4" descr="A graph of different colored lines&#10;&#10;Description automatically generated">
+            <a:extLst>
+              <a:ext uri="{FF2B5EF4-FFF2-40B4-BE49-F238E27FC236}">
+                <a16:creationId xmlns:a16="http://schemas.microsoft.com/office/drawing/2014/main" id="{88B00C01-54CC-4FCB-AD14-3EE1F140AEF7}"/>
+              </a:ext>
+            </a:extLst>
+          </p:cNvPr>
+          <p:cNvPicPr>
+            <a:picLocks noChangeAspect="1"/>
+          </p:cNvPicPr>
+          <p:nvPr/>
+        </p:nvPicPr>
+        <p:blipFill>
+          <a:blip r:embed="rId2">
+            <a:extLst>
+              <a:ext uri="{28A0092B-C50C-407E-A947-70E740481C1C}">
+                <a14:useLocalDpi xmlns:a14="http://schemas.microsoft.com/office/drawing/2010/main" val="0"/>
+              </a:ext>
+            </a:extLst>
+          </a:blip>
+          <a:stretch>
+            <a:fillRect/>
+          </a:stretch>
+        </p:blipFill>
+        <p:spPr>
+          <a:xfrm>
+            <a:off x="838200" y="2016006"/>
+            <a:ext cx="5852172" cy="4389129"/>
+          </a:xfrm>
+          <a:prstGeom prst="rect">
+            <a:avLst/>
+          </a:prstGeom>
+        </p:spPr>
+      </p:pic>
+      <p:sp>
+        <p:nvSpPr>
+          <p:cNvPr id="6" name="TextBox 5">
+            <a:extLst>
+              <a:ext uri="{FF2B5EF4-FFF2-40B4-BE49-F238E27FC236}">
+                <a16:creationId xmlns:a16="http://schemas.microsoft.com/office/drawing/2014/main" id="{2968D2DB-CE3C-56FE-10AD-F38287AD3E96}"/>
+              </a:ext>
+            </a:extLst>
+          </p:cNvPr>
+          <p:cNvSpPr txBox="1"/>
+          <p:nvPr/>
+        </p:nvSpPr>
+        <p:spPr>
+          <a:xfrm>
+            <a:off x="6690372" y="2136808"/>
+            <a:ext cx="4956196" cy="1754326"/>
+          </a:xfrm>
+          <a:prstGeom prst="rect">
+            <a:avLst/>
+          </a:prstGeom>
+          <a:noFill/>
+        </p:spPr>
+        <p:txBody>
+          <a:bodyPr wrap="square" rtlCol="0">
+            <a:spAutoFit/>
+          </a:bodyPr>
+          <a:lstStyle/>
+          <a:p>
+            <a:r>
+              <a:rPr lang="en-GB" dirty="0"/>
+              <a:t>This shows the performance with some kind of knowledge about what is about to be appended. 100 shows no knowledge. 500 shows that we know it will be at least 500 items but could be more. 1000 shows that we know it will be at most 1000 items appended to the array.</a:t>
+            </a:r>
+          </a:p>
+        </p:txBody>
+      </p:sp>
+    </p:spTree>
+    <p:extLst>
+      <p:ext uri="{BB962C8B-B14F-4D97-AF65-F5344CB8AC3E}">
+        <p14:creationId xmlns:p14="http://schemas.microsoft.com/office/powerpoint/2010/main" val="2038074680"/>
       </p:ext>
     </p:extLst>
   </p:cSld>

</xml_diff>